<commit_message>
Ajustes muerte enemigo y presentación
</commit_message>
<xml_diff>
--- a/Ninja Adventures.pptx
+++ b/Ninja Adventures.pptx
@@ -113,7 +113,7 @@
   </p:defaultTextStyle>
   <p:extLst>
     <p:ext uri="{EFAFB233-063F-42B5-8137-9DF3F51BA10A}">
-      <p15:sldGuideLst xmlns:p15="http://schemas.microsoft.com/office/powerpoint/2012/main">
+      <p15:sldGuideLst xmlns:p15="http://schemas.microsoft.com/office/powerpoint/2012/main" xmlns="">
         <p15:guide id="1" orient="horz" pos="2160">
           <p15:clr>
             <a:srgbClr val="A4A3A4"/>
@@ -262,7 +262,7 @@
             <a:fld id="{6024F3B6-2B38-469D-811E-CEF6C706B97C}" type="datetimeFigureOut">
               <a:rPr lang="es-ES" smtClean="0"/>
               <a:pPr/>
-              <a:t>29/05/2017</a:t>
+              <a:t>30/05/2017</a:t>
             </a:fld>
             <a:endParaRPr lang="es-ES"/>
           </a:p>
@@ -314,7 +314,7 @@
     </p:spTree>
     <p:extLst>
       <p:ext uri="{BB962C8B-B14F-4D97-AF65-F5344CB8AC3E}">
-        <p14:creationId xmlns:p14="http://schemas.microsoft.com/office/powerpoint/2010/main" val="2973614386"/>
+        <p14:creationId xmlns:p14="http://schemas.microsoft.com/office/powerpoint/2010/main" xmlns="" val="2973614386"/>
       </p:ext>
     </p:extLst>
   </p:cSld>
@@ -434,7 +434,7 @@
             <a:fld id="{6024F3B6-2B38-469D-811E-CEF6C706B97C}" type="datetimeFigureOut">
               <a:rPr lang="es-ES" smtClean="0"/>
               <a:pPr/>
-              <a:t>29/05/2017</a:t>
+              <a:t>30/05/2017</a:t>
             </a:fld>
             <a:endParaRPr lang="es-ES"/>
           </a:p>
@@ -486,7 +486,7 @@
     </p:spTree>
     <p:extLst>
       <p:ext uri="{BB962C8B-B14F-4D97-AF65-F5344CB8AC3E}">
-        <p14:creationId xmlns:p14="http://schemas.microsoft.com/office/powerpoint/2010/main" val="910709605"/>
+        <p14:creationId xmlns:p14="http://schemas.microsoft.com/office/powerpoint/2010/main" xmlns="" val="910709605"/>
       </p:ext>
     </p:extLst>
   </p:cSld>
@@ -616,7 +616,7 @@
             <a:fld id="{6024F3B6-2B38-469D-811E-CEF6C706B97C}" type="datetimeFigureOut">
               <a:rPr lang="es-ES" smtClean="0"/>
               <a:pPr/>
-              <a:t>29/05/2017</a:t>
+              <a:t>30/05/2017</a:t>
             </a:fld>
             <a:endParaRPr lang="es-ES"/>
           </a:p>
@@ -668,7 +668,7 @@
     </p:spTree>
     <p:extLst>
       <p:ext uri="{BB962C8B-B14F-4D97-AF65-F5344CB8AC3E}">
-        <p14:creationId xmlns:p14="http://schemas.microsoft.com/office/powerpoint/2010/main" val="1639334178"/>
+        <p14:creationId xmlns:p14="http://schemas.microsoft.com/office/powerpoint/2010/main" xmlns="" val="1639334178"/>
       </p:ext>
     </p:extLst>
   </p:cSld>
@@ -788,7 +788,7 @@
             <a:fld id="{6024F3B6-2B38-469D-811E-CEF6C706B97C}" type="datetimeFigureOut">
               <a:rPr lang="es-ES" smtClean="0"/>
               <a:pPr/>
-              <a:t>29/05/2017</a:t>
+              <a:t>30/05/2017</a:t>
             </a:fld>
             <a:endParaRPr lang="es-ES"/>
           </a:p>
@@ -840,7 +840,7 @@
     </p:spTree>
     <p:extLst>
       <p:ext uri="{BB962C8B-B14F-4D97-AF65-F5344CB8AC3E}">
-        <p14:creationId xmlns:p14="http://schemas.microsoft.com/office/powerpoint/2010/main" val="1446113160"/>
+        <p14:creationId xmlns:p14="http://schemas.microsoft.com/office/powerpoint/2010/main" xmlns="" val="1446113160"/>
       </p:ext>
     </p:extLst>
   </p:cSld>
@@ -1036,7 +1036,7 @@
             <a:fld id="{6024F3B6-2B38-469D-811E-CEF6C706B97C}" type="datetimeFigureOut">
               <a:rPr lang="es-ES" smtClean="0"/>
               <a:pPr/>
-              <a:t>29/05/2017</a:t>
+              <a:t>30/05/2017</a:t>
             </a:fld>
             <a:endParaRPr lang="es-ES"/>
           </a:p>
@@ -1088,7 +1088,7 @@
     </p:spTree>
     <p:extLst>
       <p:ext uri="{BB962C8B-B14F-4D97-AF65-F5344CB8AC3E}">
-        <p14:creationId xmlns:p14="http://schemas.microsoft.com/office/powerpoint/2010/main" val="1987569561"/>
+        <p14:creationId xmlns:p14="http://schemas.microsoft.com/office/powerpoint/2010/main" xmlns="" val="1987569561"/>
       </p:ext>
     </p:extLst>
   </p:cSld>
@@ -1270,7 +1270,7 @@
             <a:fld id="{6024F3B6-2B38-469D-811E-CEF6C706B97C}" type="datetimeFigureOut">
               <a:rPr lang="es-ES" smtClean="0"/>
               <a:pPr/>
-              <a:t>29/05/2017</a:t>
+              <a:t>30/05/2017</a:t>
             </a:fld>
             <a:endParaRPr lang="es-ES"/>
           </a:p>
@@ -1322,7 +1322,7 @@
     </p:spTree>
     <p:extLst>
       <p:ext uri="{BB962C8B-B14F-4D97-AF65-F5344CB8AC3E}">
-        <p14:creationId xmlns:p14="http://schemas.microsoft.com/office/powerpoint/2010/main" val="3436059269"/>
+        <p14:creationId xmlns:p14="http://schemas.microsoft.com/office/powerpoint/2010/main" xmlns="" val="3436059269"/>
       </p:ext>
     </p:extLst>
   </p:cSld>
@@ -1639,7 +1639,7 @@
             <a:fld id="{6024F3B6-2B38-469D-811E-CEF6C706B97C}" type="datetimeFigureOut">
               <a:rPr lang="es-ES" smtClean="0"/>
               <a:pPr/>
-              <a:t>29/05/2017</a:t>
+              <a:t>30/05/2017</a:t>
             </a:fld>
             <a:endParaRPr lang="es-ES"/>
           </a:p>
@@ -1691,7 +1691,7 @@
     </p:spTree>
     <p:extLst>
       <p:ext uri="{BB962C8B-B14F-4D97-AF65-F5344CB8AC3E}">
-        <p14:creationId xmlns:p14="http://schemas.microsoft.com/office/powerpoint/2010/main" val="1386418674"/>
+        <p14:creationId xmlns:p14="http://schemas.microsoft.com/office/powerpoint/2010/main" xmlns="" val="1386418674"/>
       </p:ext>
     </p:extLst>
   </p:cSld>
@@ -1759,7 +1759,7 @@
             <a:fld id="{6024F3B6-2B38-469D-811E-CEF6C706B97C}" type="datetimeFigureOut">
               <a:rPr lang="es-ES" smtClean="0"/>
               <a:pPr/>
-              <a:t>29/05/2017</a:t>
+              <a:t>30/05/2017</a:t>
             </a:fld>
             <a:endParaRPr lang="es-ES"/>
           </a:p>
@@ -1811,7 +1811,7 @@
     </p:spTree>
     <p:extLst>
       <p:ext uri="{BB962C8B-B14F-4D97-AF65-F5344CB8AC3E}">
-        <p14:creationId xmlns:p14="http://schemas.microsoft.com/office/powerpoint/2010/main" val="3626756392"/>
+        <p14:creationId xmlns:p14="http://schemas.microsoft.com/office/powerpoint/2010/main" xmlns="" val="3626756392"/>
       </p:ext>
     </p:extLst>
   </p:cSld>
@@ -1856,7 +1856,7 @@
             <a:fld id="{6024F3B6-2B38-469D-811E-CEF6C706B97C}" type="datetimeFigureOut">
               <a:rPr lang="es-ES" smtClean="0"/>
               <a:pPr/>
-              <a:t>29/05/2017</a:t>
+              <a:t>30/05/2017</a:t>
             </a:fld>
             <a:endParaRPr lang="es-ES"/>
           </a:p>
@@ -1908,7 +1908,7 @@
     </p:spTree>
     <p:extLst>
       <p:ext uri="{BB962C8B-B14F-4D97-AF65-F5344CB8AC3E}">
-        <p14:creationId xmlns:p14="http://schemas.microsoft.com/office/powerpoint/2010/main" val="928811582"/>
+        <p14:creationId xmlns:p14="http://schemas.microsoft.com/office/powerpoint/2010/main" xmlns="" val="928811582"/>
       </p:ext>
     </p:extLst>
   </p:cSld>
@@ -2135,7 +2135,7 @@
             <a:fld id="{6024F3B6-2B38-469D-811E-CEF6C706B97C}" type="datetimeFigureOut">
               <a:rPr lang="es-ES" smtClean="0"/>
               <a:pPr/>
-              <a:t>29/05/2017</a:t>
+              <a:t>30/05/2017</a:t>
             </a:fld>
             <a:endParaRPr lang="es-ES"/>
           </a:p>
@@ -2187,7 +2187,7 @@
     </p:spTree>
     <p:extLst>
       <p:ext uri="{BB962C8B-B14F-4D97-AF65-F5344CB8AC3E}">
-        <p14:creationId xmlns:p14="http://schemas.microsoft.com/office/powerpoint/2010/main" val="139424320"/>
+        <p14:creationId xmlns:p14="http://schemas.microsoft.com/office/powerpoint/2010/main" xmlns="" val="139424320"/>
       </p:ext>
     </p:extLst>
   </p:cSld>
@@ -2390,7 +2390,7 @@
             <a:fld id="{6024F3B6-2B38-469D-811E-CEF6C706B97C}" type="datetimeFigureOut">
               <a:rPr lang="es-ES" smtClean="0"/>
               <a:pPr/>
-              <a:t>29/05/2017</a:t>
+              <a:t>30/05/2017</a:t>
             </a:fld>
             <a:endParaRPr lang="es-ES"/>
           </a:p>
@@ -2442,7 +2442,7 @@
     </p:spTree>
     <p:extLst>
       <p:ext uri="{BB962C8B-B14F-4D97-AF65-F5344CB8AC3E}">
-        <p14:creationId xmlns:p14="http://schemas.microsoft.com/office/powerpoint/2010/main" val="196284481"/>
+        <p14:creationId xmlns:p14="http://schemas.microsoft.com/office/powerpoint/2010/main" xmlns="" val="196284481"/>
       </p:ext>
     </p:extLst>
   </p:cSld>
@@ -2605,7 +2605,7 @@
             <a:fld id="{6024F3B6-2B38-469D-811E-CEF6C706B97C}" type="datetimeFigureOut">
               <a:rPr lang="es-ES" smtClean="0"/>
               <a:pPr/>
-              <a:t>29/05/2017</a:t>
+              <a:t>30/05/2017</a:t>
             </a:fld>
             <a:endParaRPr lang="es-ES"/>
           </a:p>
@@ -2693,7 +2693,7 @@
     </p:spTree>
     <p:extLst>
       <p:ext uri="{BB962C8B-B14F-4D97-AF65-F5344CB8AC3E}">
-        <p14:creationId xmlns:p14="http://schemas.microsoft.com/office/powerpoint/2010/main" val="406096958"/>
+        <p14:creationId xmlns:p14="http://schemas.microsoft.com/office/powerpoint/2010/main" xmlns="" val="406096958"/>
       </p:ext>
     </p:extLst>
   </p:cSld>
@@ -3003,7 +3003,7 @@
           <a:blip r:embed="rId2">
             <a:extLst>
               <a:ext uri="{BEBA8EAE-BF5A-486C-A8C5-ECC9F3942E4B}">
-                <a14:imgProps xmlns:a14="http://schemas.microsoft.com/office/drawing/2010/main">
+                <a14:imgProps xmlns:a14="http://schemas.microsoft.com/office/drawing/2010/main" xmlns="">
                   <a14:imgLayer r:embed="rId3">
                     <a14:imgEffect>
                       <a14:brightnessContrast bright="15000"/>
@@ -3045,7 +3045,7 @@
           <a:blip r:embed="rId4">
             <a:extLst>
               <a:ext uri="{BEBA8EAE-BF5A-486C-A8C5-ECC9F3942E4B}">
-                <a14:imgProps xmlns:a14="http://schemas.microsoft.com/office/drawing/2010/main">
+                <a14:imgProps xmlns:a14="http://schemas.microsoft.com/office/drawing/2010/main" xmlns="">
                   <a14:imgLayer r:embed="rId5">
                     <a14:imgEffect>
                       <a14:brightnessContrast bright="25000"/>
@@ -3054,7 +3054,7 @@
                 </a14:imgProps>
               </a:ext>
               <a:ext uri="{28A0092B-C50C-407E-A947-70E740481C1C}">
-                <a14:useLocalDpi xmlns:a14="http://schemas.microsoft.com/office/drawing/2010/main" val="0"/>
+                <a14:useLocalDpi xmlns:a14="http://schemas.microsoft.com/office/drawing/2010/main" xmlns="" val="0"/>
               </a:ext>
             </a:extLst>
           </a:blip>
@@ -3260,16 +3260,7 @@
                 </a:solidFill>
                 <a:latin typeface="Tw Cen MT Condensed" panose="020B0606020104020203" pitchFamily="34" charset="0"/>
               </a:rPr>
-              <a:t> </a:t>
-            </a:r>
-            <a:r>
-              <a:rPr lang="es-ES" sz="2800" dirty="0" smtClean="0">
-                <a:solidFill>
-                  <a:schemeClr val="bg1"/>
-                </a:solidFill>
-                <a:latin typeface="Tw Cen MT Condensed" panose="020B0606020104020203" pitchFamily="34" charset="0"/>
-              </a:rPr>
-              <a:t>Priego</a:t>
+              <a:t> Priego</a:t>
             </a:r>
           </a:p>
           <a:p>
@@ -3306,7 +3297,7 @@
     </p:spTree>
     <p:extLst>
       <p:ext uri="{BB962C8B-B14F-4D97-AF65-F5344CB8AC3E}">
-        <p14:creationId xmlns:p14="http://schemas.microsoft.com/office/powerpoint/2010/main" val="3409625592"/>
+        <p14:creationId xmlns:p14="http://schemas.microsoft.com/office/powerpoint/2010/main" xmlns="" val="3409625592"/>
       </p:ext>
     </p:extLst>
   </p:cSld>
@@ -3332,7 +3323,7 @@
           <a:blip r:embed="rId2">
             <a:extLst>
               <a:ext uri="{BEBA8EAE-BF5A-486C-A8C5-ECC9F3942E4B}">
-                <a14:imgProps xmlns:a14="http://schemas.microsoft.com/office/drawing/2010/main">
+                <a14:imgProps xmlns:a14="http://schemas.microsoft.com/office/drawing/2010/main" xmlns="">
                   <a14:imgLayer r:embed="rId3">
                     <a14:imgEffect>
                       <a14:brightnessContrast bright="15000"/>
@@ -3563,7 +3554,7 @@
           <a:blip r:embed="rId5" cstate="print">
             <a:extLst>
               <a:ext uri="{BEBA8EAE-BF5A-486C-A8C5-ECC9F3942E4B}">
-                <a14:imgProps xmlns:a14="http://schemas.microsoft.com/office/drawing/2010/main">
+                <a14:imgProps xmlns:a14="http://schemas.microsoft.com/office/drawing/2010/main" xmlns="">
                   <a14:imgLayer r:embed="rId6">
                     <a14:imgEffect>
                       <a14:brightnessContrast bright="25000"/>
@@ -3572,7 +3563,7 @@
                 </a14:imgProps>
               </a:ext>
               <a:ext uri="{28A0092B-C50C-407E-A947-70E740481C1C}">
-                <a14:useLocalDpi xmlns:a14="http://schemas.microsoft.com/office/drawing/2010/main" val="0"/>
+                <a14:useLocalDpi xmlns:a14="http://schemas.microsoft.com/office/drawing/2010/main" xmlns="" val="0"/>
               </a:ext>
             </a:extLst>
           </a:blip>
@@ -3593,7 +3584,7 @@
     </p:spTree>
     <p:extLst>
       <p:ext uri="{BB962C8B-B14F-4D97-AF65-F5344CB8AC3E}">
-        <p14:creationId xmlns:p14="http://schemas.microsoft.com/office/powerpoint/2010/main" val="2317901928"/>
+        <p14:creationId xmlns:p14="http://schemas.microsoft.com/office/powerpoint/2010/main" xmlns="" val="2317901928"/>
       </p:ext>
     </p:extLst>
   </p:cSld>
@@ -3619,7 +3610,7 @@
           <a:blip r:embed="rId2">
             <a:extLst>
               <a:ext uri="{BEBA8EAE-BF5A-486C-A8C5-ECC9F3942E4B}">
-                <a14:imgProps xmlns:a14="http://schemas.microsoft.com/office/drawing/2010/main">
+                <a14:imgProps xmlns:a14="http://schemas.microsoft.com/office/drawing/2010/main" xmlns="">
                   <a14:imgLayer r:embed="rId3">
                     <a14:imgEffect>
                       <a14:brightnessContrast bright="15000"/>
@@ -3661,7 +3652,7 @@
           <a:blip r:embed="rId4" cstate="print">
             <a:extLst>
               <a:ext uri="{BEBA8EAE-BF5A-486C-A8C5-ECC9F3942E4B}">
-                <a14:imgProps xmlns:a14="http://schemas.microsoft.com/office/drawing/2010/main">
+                <a14:imgProps xmlns:a14="http://schemas.microsoft.com/office/drawing/2010/main" xmlns="">
                   <a14:imgLayer r:embed="rId5">
                     <a14:imgEffect>
                       <a14:brightnessContrast bright="25000"/>
@@ -3670,7 +3661,7 @@
                 </a14:imgProps>
               </a:ext>
               <a:ext uri="{28A0092B-C50C-407E-A947-70E740481C1C}">
-                <a14:useLocalDpi xmlns:a14="http://schemas.microsoft.com/office/drawing/2010/main" val="0"/>
+                <a14:useLocalDpi xmlns:a14="http://schemas.microsoft.com/office/drawing/2010/main" xmlns="" val="0"/>
               </a:ext>
             </a:extLst>
           </a:blip>
@@ -4179,39 +4170,7 @@
                 </a:effectLst>
                 <a:latin typeface="Tw Cen MT Condensed" panose="020B0606020104020203" pitchFamily="34" charset="0"/>
               </a:rPr>
-              <a:t> Recoger </a:t>
-            </a:r>
-            <a:r>
-              <a:rPr lang="es-ES" sz="4000" dirty="0" smtClean="0">
-                <a:solidFill>
-                  <a:schemeClr val="bg1"/>
-                </a:solidFill>
-                <a:effectLst>
-                  <a:outerShdw blurRad="38100" dist="38100" dir="2700000" algn="tl">
-                    <a:srgbClr val="000000">
-                      <a:alpha val="43137"/>
-                    </a:srgbClr>
-                  </a:outerShdw>
-                </a:effectLst>
-                <a:latin typeface="Tw Cen MT Condensed" panose="020B0606020104020203" pitchFamily="34" charset="0"/>
-              </a:rPr>
-              <a:t>monedas </a:t>
-            </a:r>
-            <a:r>
-              <a:rPr lang="es-ES" sz="4000" dirty="0" smtClean="0">
-                <a:solidFill>
-                  <a:schemeClr val="bg1"/>
-                </a:solidFill>
-                <a:effectLst>
-                  <a:outerShdw blurRad="38100" dist="38100" dir="2700000" algn="tl">
-                    <a:srgbClr val="000000">
-                      <a:alpha val="43137"/>
-                    </a:srgbClr>
-                  </a:outerShdw>
-                </a:effectLst>
-                <a:latin typeface="Tw Cen MT Condensed" panose="020B0606020104020203" pitchFamily="34" charset="0"/>
-              </a:rPr>
-              <a:t>para puntuación</a:t>
+              <a:t> Recoger monedas para puntuación</a:t>
             </a:r>
           </a:p>
           <a:p>
@@ -4294,7 +4253,7 @@
           <a:blip r:embed="rId7" cstate="print">
             <a:extLst>
               <a:ext uri="{BEBA8EAE-BF5A-486C-A8C5-ECC9F3942E4B}">
-                <a14:imgProps xmlns:a14="http://schemas.microsoft.com/office/drawing/2010/main">
+                <a14:imgProps xmlns:a14="http://schemas.microsoft.com/office/drawing/2010/main" xmlns="">
                   <a14:imgLayer r:embed="rId8">
                     <a14:imgEffect>
                       <a14:brightnessContrast bright="25000"/>
@@ -4303,7 +4262,7 @@
                 </a14:imgProps>
               </a:ext>
               <a:ext uri="{28A0092B-C50C-407E-A947-70E740481C1C}">
-                <a14:useLocalDpi xmlns:a14="http://schemas.microsoft.com/office/drawing/2010/main" val="0"/>
+                <a14:useLocalDpi xmlns:a14="http://schemas.microsoft.com/office/drawing/2010/main" xmlns="" val="0"/>
               </a:ext>
             </a:extLst>
           </a:blip>
@@ -4333,7 +4292,7 @@
           <a:blip r:embed="rId9" cstate="print">
             <a:extLst>
               <a:ext uri="{BEBA8EAE-BF5A-486C-A8C5-ECC9F3942E4B}">
-                <a14:imgProps xmlns:a14="http://schemas.microsoft.com/office/drawing/2010/main">
+                <a14:imgProps xmlns:a14="http://schemas.microsoft.com/office/drawing/2010/main" xmlns="">
                   <a14:imgLayer r:embed="rId10">
                     <a14:imgEffect>
                       <a14:brightnessContrast bright="25000"/>
@@ -4342,7 +4301,7 @@
                 </a14:imgProps>
               </a:ext>
               <a:ext uri="{28A0092B-C50C-407E-A947-70E740481C1C}">
-                <a14:useLocalDpi xmlns:a14="http://schemas.microsoft.com/office/drawing/2010/main" val="0"/>
+                <a14:useLocalDpi xmlns:a14="http://schemas.microsoft.com/office/drawing/2010/main" xmlns="" val="0"/>
               </a:ext>
             </a:extLst>
           </a:blip>
@@ -4372,7 +4331,7 @@
           <a:blip r:embed="rId11" cstate="print">
             <a:extLst>
               <a:ext uri="{BEBA8EAE-BF5A-486C-A8C5-ECC9F3942E4B}">
-                <a14:imgProps xmlns:a14="http://schemas.microsoft.com/office/drawing/2010/main">
+                <a14:imgProps xmlns:a14="http://schemas.microsoft.com/office/drawing/2010/main" xmlns="">
                   <a14:imgLayer r:embed="rId12">
                     <a14:imgEffect>
                       <a14:brightnessContrast bright="25000"/>
@@ -4381,7 +4340,7 @@
                 </a14:imgProps>
               </a:ext>
               <a:ext uri="{28A0092B-C50C-407E-A947-70E740481C1C}">
-                <a14:useLocalDpi xmlns:a14="http://schemas.microsoft.com/office/drawing/2010/main" val="0"/>
+                <a14:useLocalDpi xmlns:a14="http://schemas.microsoft.com/office/drawing/2010/main" xmlns="" val="0"/>
               </a:ext>
             </a:extLst>
           </a:blip>
@@ -4411,7 +4370,7 @@
           <a:blip r:embed="rId13" cstate="print">
             <a:extLst>
               <a:ext uri="{BEBA8EAE-BF5A-486C-A8C5-ECC9F3942E4B}">
-                <a14:imgProps xmlns:a14="http://schemas.microsoft.com/office/drawing/2010/main">
+                <a14:imgProps xmlns:a14="http://schemas.microsoft.com/office/drawing/2010/main" xmlns="">
                   <a14:imgLayer r:embed="rId14">
                     <a14:imgEffect>
                       <a14:brightnessContrast bright="25000"/>
@@ -4420,7 +4379,7 @@
                 </a14:imgProps>
               </a:ext>
               <a:ext uri="{28A0092B-C50C-407E-A947-70E740481C1C}">
-                <a14:useLocalDpi xmlns:a14="http://schemas.microsoft.com/office/drawing/2010/main" val="0"/>
+                <a14:useLocalDpi xmlns:a14="http://schemas.microsoft.com/office/drawing/2010/main" xmlns="" val="0"/>
               </a:ext>
             </a:extLst>
           </a:blip>
@@ -4441,7 +4400,7 @@
     </p:spTree>
     <p:extLst>
       <p:ext uri="{BB962C8B-B14F-4D97-AF65-F5344CB8AC3E}">
-        <p14:creationId xmlns:p14="http://schemas.microsoft.com/office/powerpoint/2010/main" val="92705683"/>
+        <p14:creationId xmlns:p14="http://schemas.microsoft.com/office/powerpoint/2010/main" xmlns="" val="92705683"/>
       </p:ext>
     </p:extLst>
   </p:cSld>
@@ -4467,7 +4426,7 @@
           <a:blip r:embed="rId2">
             <a:extLst>
               <a:ext uri="{BEBA8EAE-BF5A-486C-A8C5-ECC9F3942E4B}">
-                <a14:imgProps xmlns:a14="http://schemas.microsoft.com/office/drawing/2010/main">
+                <a14:imgProps xmlns:a14="http://schemas.microsoft.com/office/drawing/2010/main" xmlns="">
                   <a14:imgLayer r:embed="rId3">
                     <a14:imgEffect>
                       <a14:brightnessContrast bright="15000"/>
@@ -4623,7 +4582,10 @@
             <a:r>
               <a:rPr lang="es-ES" sz="4000" dirty="0" smtClean="0">
                 <a:solidFill>
-                  <a:schemeClr val="bg1"/>
+                  <a:schemeClr val="accent6">
+                    <a:lumMod val="40000"/>
+                    <a:lumOff val="60000"/>
+                  </a:schemeClr>
                 </a:solidFill>
                 <a:effectLst>
                   <a:outerShdw blurRad="38100" dist="38100" dir="2700000" algn="tl">
@@ -5035,7 +4997,10 @@
             <a:r>
               <a:rPr lang="es-ES" sz="4000" dirty="0" smtClean="0">
                 <a:solidFill>
-                  <a:schemeClr val="bg1"/>
+                  <a:schemeClr val="accent6">
+                    <a:lumMod val="40000"/>
+                    <a:lumOff val="60000"/>
+                  </a:schemeClr>
                 </a:solidFill>
                 <a:effectLst>
                   <a:outerShdw blurRad="38100" dist="38100" dir="2700000" algn="tl">
@@ -5219,7 +5184,7 @@
           <a:blip r:embed="rId5" cstate="print">
             <a:extLst>
               <a:ext uri="{BEBA8EAE-BF5A-486C-A8C5-ECC9F3942E4B}">
-                <a14:imgProps xmlns:a14="http://schemas.microsoft.com/office/drawing/2010/main">
+                <a14:imgProps xmlns:a14="http://schemas.microsoft.com/office/drawing/2010/main" xmlns="">
                   <a14:imgLayer r:embed="rId6">
                     <a14:imgEffect>
                       <a14:brightnessContrast bright="25000"/>
@@ -5228,7 +5193,7 @@
                 </a14:imgProps>
               </a:ext>
               <a:ext uri="{28A0092B-C50C-407E-A947-70E740481C1C}">
-                <a14:useLocalDpi xmlns:a14="http://schemas.microsoft.com/office/drawing/2010/main" val="0"/>
+                <a14:useLocalDpi xmlns:a14="http://schemas.microsoft.com/office/drawing/2010/main" xmlns="" val="0"/>
               </a:ext>
             </a:extLst>
           </a:blip>
@@ -5258,7 +5223,7 @@
           <a:blip r:embed="rId7" cstate="print">
             <a:extLst>
               <a:ext uri="{BEBA8EAE-BF5A-486C-A8C5-ECC9F3942E4B}">
-                <a14:imgProps xmlns:a14="http://schemas.microsoft.com/office/drawing/2010/main">
+                <a14:imgProps xmlns:a14="http://schemas.microsoft.com/office/drawing/2010/main" xmlns="">
                   <a14:imgLayer r:embed="rId8">
                     <a14:imgEffect>
                       <a14:brightnessContrast bright="25000"/>
@@ -5267,7 +5232,7 @@
                 </a14:imgProps>
               </a:ext>
               <a:ext uri="{28A0092B-C50C-407E-A947-70E740481C1C}">
-                <a14:useLocalDpi xmlns:a14="http://schemas.microsoft.com/office/drawing/2010/main" val="0"/>
+                <a14:useLocalDpi xmlns:a14="http://schemas.microsoft.com/office/drawing/2010/main" xmlns="" val="0"/>
               </a:ext>
             </a:extLst>
           </a:blip>
@@ -5297,7 +5262,7 @@
           <a:blip r:embed="rId9" cstate="print">
             <a:extLst>
               <a:ext uri="{BEBA8EAE-BF5A-486C-A8C5-ECC9F3942E4B}">
-                <a14:imgProps xmlns:a14="http://schemas.microsoft.com/office/drawing/2010/main">
+                <a14:imgProps xmlns:a14="http://schemas.microsoft.com/office/drawing/2010/main" xmlns="">
                   <a14:imgLayer r:embed="rId10">
                     <a14:imgEffect>
                       <a14:brightnessContrast bright="25000"/>
@@ -5306,7 +5271,7 @@
                 </a14:imgProps>
               </a:ext>
               <a:ext uri="{28A0092B-C50C-407E-A947-70E740481C1C}">
-                <a14:useLocalDpi xmlns:a14="http://schemas.microsoft.com/office/drawing/2010/main" val="0"/>
+                <a14:useLocalDpi xmlns:a14="http://schemas.microsoft.com/office/drawing/2010/main" xmlns="" val="0"/>
               </a:ext>
             </a:extLst>
           </a:blip>
@@ -5336,7 +5301,7 @@
           <a:blip r:embed="rId11" cstate="print">
             <a:extLst>
               <a:ext uri="{BEBA8EAE-BF5A-486C-A8C5-ECC9F3942E4B}">
-                <a14:imgProps xmlns:a14="http://schemas.microsoft.com/office/drawing/2010/main">
+                <a14:imgProps xmlns:a14="http://schemas.microsoft.com/office/drawing/2010/main" xmlns="">
                   <a14:imgLayer r:embed="rId12">
                     <a14:imgEffect>
                       <a14:brightnessContrast bright="25000"/>
@@ -5345,7 +5310,7 @@
                 </a14:imgProps>
               </a:ext>
               <a:ext uri="{28A0092B-C50C-407E-A947-70E740481C1C}">
-                <a14:useLocalDpi xmlns:a14="http://schemas.microsoft.com/office/drawing/2010/main" val="0"/>
+                <a14:useLocalDpi xmlns:a14="http://schemas.microsoft.com/office/drawing/2010/main" xmlns="" val="0"/>
               </a:ext>
             </a:extLst>
           </a:blip>
@@ -5366,7 +5331,7 @@
     </p:spTree>
     <p:extLst>
       <p:ext uri="{BB962C8B-B14F-4D97-AF65-F5344CB8AC3E}">
-        <p14:creationId xmlns:p14="http://schemas.microsoft.com/office/powerpoint/2010/main" val="2587745999"/>
+        <p14:creationId xmlns:p14="http://schemas.microsoft.com/office/powerpoint/2010/main" xmlns="" val="2587745999"/>
       </p:ext>
     </p:extLst>
   </p:cSld>
@@ -5392,7 +5357,7 @@
           <a:blip r:embed="rId2">
             <a:extLst>
               <a:ext uri="{BEBA8EAE-BF5A-486C-A8C5-ECC9F3942E4B}">
-                <a14:imgProps xmlns:a14="http://schemas.microsoft.com/office/drawing/2010/main">
+                <a14:imgProps xmlns:a14="http://schemas.microsoft.com/office/drawing/2010/main" xmlns="">
                   <a14:imgLayer r:embed="rId3">
                     <a14:imgEffect>
                       <a14:brightnessContrast bright="15000"/>
@@ -5530,7 +5495,7 @@
         </p:nvSpPr>
         <p:spPr>
           <a:xfrm>
-            <a:off x="838200" y="1825625"/>
+            <a:off x="1041400" y="1533525"/>
             <a:ext cx="9559834" cy="4351338"/>
           </a:xfrm>
         </p:spPr>
@@ -5546,47 +5511,9 @@
               </a:tabLst>
             </a:pPr>
             <a:r>
-              <a:rPr lang="es-ES" sz="4000" b="1" dirty="0" smtClean="0">
+              <a:rPr lang="es-ES" sz="3500" b="1" dirty="0" smtClean="0">
                 <a:solidFill>
                   <a:schemeClr val="accent6">
-                    <a:lumMod val="40000"/>
-                    <a:lumOff val="60000"/>
-                  </a:schemeClr>
-                </a:solidFill>
-                <a:effectLst>
-                  <a:outerShdw blurRad="38100" dist="38100" dir="2700000" algn="tl">
-                    <a:srgbClr val="000000">
-                      <a:alpha val="43137"/>
-                    </a:srgbClr>
-                  </a:outerShdw>
-                </a:effectLst>
-                <a:latin typeface="Tw Cen MT Condensed" panose="020B0606020104020203" pitchFamily="34" charset="0"/>
-              </a:rPr>
-              <a:t> Enemigo</a:t>
-            </a:r>
-            <a:r>
-              <a:rPr lang="es-ES" sz="4000" b="1" dirty="0" smtClean="0">
-                <a:solidFill>
-                  <a:schemeClr val="accent6">
-                    <a:lumMod val="40000"/>
-                    <a:lumOff val="60000"/>
-                  </a:schemeClr>
-                </a:solidFill>
-                <a:effectLst>
-                  <a:outerShdw blurRad="38100" dist="38100" dir="2700000" algn="tl">
-                    <a:srgbClr val="000000">
-                      <a:alpha val="43137"/>
-                    </a:srgbClr>
-                  </a:outerShdw>
-                </a:effectLst>
-                <a:latin typeface="Tw Cen MT Condensed" panose="020B0606020104020203" pitchFamily="34" charset="0"/>
-              </a:rPr>
-              <a:t>:</a:t>
-            </a:r>
-            <a:r>
-              <a:rPr lang="es-ES" sz="4000" b="1" dirty="0" smtClean="0">
-                <a:solidFill>
-                  <a:schemeClr val="accent4">
                     <a:lumMod val="40000"/>
                     <a:lumOff val="60000"/>
                   </a:schemeClr>
@@ -5603,7 +5530,45 @@
               <a:t> </a:t>
             </a:r>
             <a:r>
-              <a:rPr lang="es-ES" sz="4000" dirty="0" smtClean="0">
+              <a:rPr lang="es-ES" sz="3500" b="1" dirty="0" smtClean="0">
+                <a:solidFill>
+                  <a:schemeClr val="accent6">
+                    <a:lumMod val="40000"/>
+                    <a:lumOff val="60000"/>
+                  </a:schemeClr>
+                </a:solidFill>
+                <a:effectLst>
+                  <a:outerShdw blurRad="38100" dist="38100" dir="2700000" algn="tl">
+                    <a:srgbClr val="000000">
+                      <a:alpha val="43137"/>
+                    </a:srgbClr>
+                  </a:outerShdw>
+                </a:effectLst>
+                <a:latin typeface="Tw Cen MT Condensed" panose="020B0606020104020203" pitchFamily="34" charset="0"/>
+              </a:rPr>
+              <a:t>Enemigos:</a:t>
+            </a:r>
+            <a:r>
+              <a:rPr lang="es-ES" sz="3500" b="1" dirty="0" smtClean="0">
+                <a:solidFill>
+                  <a:schemeClr val="accent4">
+                    <a:lumMod val="40000"/>
+                    <a:lumOff val="60000"/>
+                  </a:schemeClr>
+                </a:solidFill>
+                <a:effectLst>
+                  <a:outerShdw blurRad="38100" dist="38100" dir="2700000" algn="tl">
+                    <a:srgbClr val="000000">
+                      <a:alpha val="43137"/>
+                    </a:srgbClr>
+                  </a:outerShdw>
+                </a:effectLst>
+                <a:latin typeface="Tw Cen MT Condensed" panose="020B0606020104020203" pitchFamily="34" charset="0"/>
+              </a:rPr>
+              <a:t> </a:t>
+            </a:r>
+            <a:r>
+              <a:rPr lang="es-ES" sz="3500" dirty="0" smtClean="0">
                 <a:solidFill>
                   <a:schemeClr val="bg1"/>
                 </a:solidFill>
@@ -5626,7 +5591,7 @@
               </a:tabLst>
             </a:pPr>
             <a:r>
-              <a:rPr lang="es-ES" sz="4000" b="1" dirty="0" smtClean="0">
+              <a:rPr lang="es-ES" sz="3500" b="1" dirty="0" smtClean="0">
                 <a:solidFill>
                   <a:schemeClr val="accent6">
                     <a:lumMod val="40000"/>
@@ -5645,7 +5610,7 @@
               <a:t> Ventilador: </a:t>
             </a:r>
             <a:r>
-              <a:rPr lang="es-ES" sz="4000" dirty="0" smtClean="0">
+              <a:rPr lang="es-ES" sz="3500" dirty="0" smtClean="0">
                 <a:solidFill>
                   <a:schemeClr val="bg1"/>
                 </a:solidFill>
@@ -5668,7 +5633,7 @@
               </a:tabLst>
             </a:pPr>
             <a:r>
-              <a:rPr lang="es-ES" sz="4000" dirty="0">
+              <a:rPr lang="es-ES" sz="3500" dirty="0">
                 <a:solidFill>
                   <a:schemeClr val="accent6">
                     <a:lumMod val="40000"/>
@@ -5687,7 +5652,7 @@
               <a:t> </a:t>
             </a:r>
             <a:r>
-              <a:rPr lang="es-ES" sz="4000" b="1" dirty="0" smtClean="0">
+              <a:rPr lang="es-ES" sz="3500" b="1" dirty="0" smtClean="0">
                 <a:solidFill>
                   <a:schemeClr val="accent6">
                     <a:lumMod val="40000"/>
@@ -5706,7 +5671,7 @@
               <a:t>Kunais: </a:t>
             </a:r>
             <a:r>
-              <a:rPr lang="es-ES" sz="4000" dirty="0" smtClean="0">
+              <a:rPr lang="es-ES" sz="3500" dirty="0" smtClean="0">
                 <a:solidFill>
                   <a:schemeClr val="bg1"/>
                 </a:solidFill>
@@ -5729,7 +5694,7 @@
               </a:tabLst>
             </a:pPr>
             <a:r>
-              <a:rPr lang="es-ES" sz="4000" b="1" dirty="0" smtClean="0">
+              <a:rPr lang="es-ES" sz="3500" b="1" dirty="0" smtClean="0">
                 <a:solidFill>
                   <a:schemeClr val="accent6">
                     <a:lumMod val="40000"/>
@@ -5748,7 +5713,7 @@
               <a:t> Puntuación: </a:t>
             </a:r>
             <a:r>
-              <a:rPr lang="es-ES" sz="4000" dirty="0" smtClean="0">
+              <a:rPr lang="es-ES" sz="3500" dirty="0" smtClean="0">
                 <a:solidFill>
                   <a:schemeClr val="bg1"/>
                 </a:solidFill>
@@ -5761,8 +5726,146 @@
                 </a:effectLst>
                 <a:latin typeface="Tw Cen MT Condensed" panose="020B0606020104020203" pitchFamily="34" charset="0"/>
               </a:rPr>
-              <a:t>el jugador podrá recoger objetos que irá encontrando.</a:t>
-            </a:r>
+              <a:t>el jugador podrá recoger objetos que irá encontrando</a:t>
+            </a:r>
+            <a:r>
+              <a:rPr lang="es-ES" sz="3500" dirty="0" smtClean="0">
+                <a:solidFill>
+                  <a:schemeClr val="bg1"/>
+                </a:solidFill>
+                <a:effectLst>
+                  <a:outerShdw blurRad="38100" dist="38100" dir="2700000" algn="tl">
+                    <a:srgbClr val="000000">
+                      <a:alpha val="43137"/>
+                    </a:srgbClr>
+                  </a:outerShdw>
+                </a:effectLst>
+                <a:latin typeface="Tw Cen MT Condensed" panose="020B0606020104020203" pitchFamily="34" charset="0"/>
+              </a:rPr>
+              <a:t>.</a:t>
+            </a:r>
+          </a:p>
+          <a:p>
+            <a:pPr algn="just">
+              <a:tabLst>
+                <a:tab pos="1878013" algn="l"/>
+              </a:tabLst>
+            </a:pPr>
+            <a:r>
+              <a:rPr lang="es-ES" sz="3500" dirty="0" smtClean="0">
+                <a:solidFill>
+                  <a:schemeClr val="accent6">
+                    <a:lumMod val="40000"/>
+                    <a:lumOff val="60000"/>
+                  </a:schemeClr>
+                </a:solidFill>
+                <a:effectLst>
+                  <a:outerShdw blurRad="38100" dist="38100" dir="2700000" algn="tl">
+                    <a:srgbClr val="000000">
+                      <a:alpha val="43137"/>
+                    </a:srgbClr>
+                  </a:outerShdw>
+                </a:effectLst>
+                <a:latin typeface="Tw Cen MT Condensed" panose="020B0606020104020203" pitchFamily="34" charset="0"/>
+              </a:rPr>
+              <a:t> </a:t>
+            </a:r>
+            <a:r>
+              <a:rPr lang="es-ES" sz="3500" dirty="0" smtClean="0">
+                <a:solidFill>
+                  <a:schemeClr val="accent6">
+                    <a:lumMod val="40000"/>
+                    <a:lumOff val="60000"/>
+                  </a:schemeClr>
+                </a:solidFill>
+                <a:effectLst>
+                  <a:outerShdw blurRad="38100" dist="38100" dir="2700000" algn="tl">
+                    <a:srgbClr val="000000">
+                      <a:alpha val="43137"/>
+                    </a:srgbClr>
+                  </a:outerShdw>
+                </a:effectLst>
+                <a:latin typeface="Tw Cen MT Condensed" panose="020B0606020104020203" pitchFamily="34" charset="0"/>
+              </a:rPr>
+              <a:t>Nuevos niveles: </a:t>
+            </a:r>
+            <a:r>
+              <a:rPr lang="es-ES" sz="3500" dirty="0" smtClean="0">
+                <a:solidFill>
+                  <a:schemeClr val="bg1"/>
+                </a:solidFill>
+                <a:effectLst>
+                  <a:outerShdw blurRad="38100" dist="38100" dir="2700000" algn="tl">
+                    <a:srgbClr val="000000">
+                      <a:alpha val="43137"/>
+                    </a:srgbClr>
+                  </a:outerShdw>
+                </a:effectLst>
+                <a:latin typeface="Tw Cen MT Condensed" panose="020B0606020104020203" pitchFamily="34" charset="0"/>
+              </a:rPr>
+              <a:t>para darle mayor duración al juego y acabar encontrando al maestro.</a:t>
+            </a:r>
+          </a:p>
+          <a:p>
+            <a:pPr algn="just">
+              <a:tabLst>
+                <a:tab pos="1878013" algn="l"/>
+              </a:tabLst>
+            </a:pPr>
+            <a:r>
+              <a:rPr lang="es-ES" sz="3500" dirty="0" smtClean="0">
+                <a:solidFill>
+                  <a:schemeClr val="accent6">
+                    <a:lumMod val="40000"/>
+                    <a:lumOff val="60000"/>
+                  </a:schemeClr>
+                </a:solidFill>
+                <a:effectLst>
+                  <a:outerShdw blurRad="38100" dist="38100" dir="2700000" algn="tl">
+                    <a:srgbClr val="000000">
+                      <a:alpha val="43137"/>
+                    </a:srgbClr>
+                  </a:outerShdw>
+                </a:effectLst>
+                <a:latin typeface="Tw Cen MT Condensed" panose="020B0606020104020203" pitchFamily="34" charset="0"/>
+              </a:rPr>
+              <a:t> </a:t>
+            </a:r>
+            <a:r>
+              <a:rPr lang="es-ES" sz="3500" dirty="0" smtClean="0">
+                <a:solidFill>
+                  <a:schemeClr val="accent6">
+                    <a:lumMod val="40000"/>
+                    <a:lumOff val="60000"/>
+                  </a:schemeClr>
+                </a:solidFill>
+                <a:effectLst>
+                  <a:outerShdw blurRad="38100" dist="38100" dir="2700000" algn="tl">
+                    <a:srgbClr val="000000">
+                      <a:alpha val="43137"/>
+                    </a:srgbClr>
+                  </a:outerShdw>
+                </a:effectLst>
+                <a:latin typeface="Tw Cen MT Condensed" panose="020B0606020104020203" pitchFamily="34" charset="0"/>
+              </a:rPr>
+              <a:t>Pantalla de inicio y finalización</a:t>
+            </a:r>
+            <a:endParaRPr lang="es-ES" sz="3500" dirty="0" smtClean="0">
+              <a:solidFill>
+                <a:schemeClr val="accent6">
+                  <a:lumMod val="40000"/>
+                  <a:lumOff val="60000"/>
+                </a:schemeClr>
+              </a:solidFill>
+              <a:effectLst>
+                <a:outerShdw blurRad="38100" dist="38100" dir="2700000" algn="tl">
+                  <a:srgbClr val="000000">
+                    <a:alpha val="43137"/>
+                  </a:srgbClr>
+                </a:outerShdw>
+              </a:effectLst>
+              <a:latin typeface="Tw Cen MT Condensed" panose="020B0606020104020203" pitchFamily="34" charset="0"/>
+            </a:endParaRPr>
           </a:p>
         </p:txBody>
       </p:sp>
@@ -5778,7 +5881,7 @@
           <a:blip r:embed="rId5" cstate="print">
             <a:extLst>
               <a:ext uri="{BEBA8EAE-BF5A-486C-A8C5-ECC9F3942E4B}">
-                <a14:imgProps xmlns:a14="http://schemas.microsoft.com/office/drawing/2010/main">
+                <a14:imgProps xmlns:a14="http://schemas.microsoft.com/office/drawing/2010/main" xmlns="">
                   <a14:imgLayer r:embed="rId6">
                     <a14:imgEffect>
                       <a14:brightnessContrast bright="25000"/>
@@ -5787,7 +5890,7 @@
                 </a14:imgProps>
               </a:ext>
               <a:ext uri="{28A0092B-C50C-407E-A947-70E740481C1C}">
-                <a14:useLocalDpi xmlns:a14="http://schemas.microsoft.com/office/drawing/2010/main" val="0"/>
+                <a14:useLocalDpi xmlns:a14="http://schemas.microsoft.com/office/drawing/2010/main" xmlns="" val="0"/>
               </a:ext>
             </a:extLst>
           </a:blip>
@@ -5808,7 +5911,7 @@
     </p:spTree>
     <p:extLst>
       <p:ext uri="{BB962C8B-B14F-4D97-AF65-F5344CB8AC3E}">
-        <p14:creationId xmlns:p14="http://schemas.microsoft.com/office/powerpoint/2010/main" val="1755762210"/>
+        <p14:creationId xmlns:p14="http://schemas.microsoft.com/office/powerpoint/2010/main" xmlns="" val="1755762210"/>
       </p:ext>
     </p:extLst>
   </p:cSld>
@@ -5834,7 +5937,7 @@
           <a:blip r:embed="rId2">
             <a:extLst>
               <a:ext uri="{BEBA8EAE-BF5A-486C-A8C5-ECC9F3942E4B}">
-                <a14:imgProps xmlns:a14="http://schemas.microsoft.com/office/drawing/2010/main">
+                <a14:imgProps xmlns:a14="http://schemas.microsoft.com/office/drawing/2010/main" xmlns="">
                   <a14:imgLayer r:embed="rId3">
                     <a14:imgEffect>
                       <a14:brightnessContrast bright="15000"/>
@@ -6416,7 +6519,7 @@
           <a:blip r:embed="rId5" cstate="print">
             <a:extLst>
               <a:ext uri="{BEBA8EAE-BF5A-486C-A8C5-ECC9F3942E4B}">
-                <a14:imgProps xmlns:a14="http://schemas.microsoft.com/office/drawing/2010/main">
+                <a14:imgProps xmlns:a14="http://schemas.microsoft.com/office/drawing/2010/main" xmlns="">
                   <a14:imgLayer r:embed="rId6">
                     <a14:imgEffect>
                       <a14:brightnessContrast bright="25000"/>
@@ -6425,7 +6528,7 @@
                 </a14:imgProps>
               </a:ext>
               <a:ext uri="{28A0092B-C50C-407E-A947-70E740481C1C}">
-                <a14:useLocalDpi xmlns:a14="http://schemas.microsoft.com/office/drawing/2010/main" val="0"/>
+                <a14:useLocalDpi xmlns:a14="http://schemas.microsoft.com/office/drawing/2010/main" xmlns="" val="0"/>
               </a:ext>
             </a:extLst>
           </a:blip>
@@ -6455,7 +6558,7 @@
           <a:blip r:embed="rId7" cstate="print">
             <a:extLst>
               <a:ext uri="{BEBA8EAE-BF5A-486C-A8C5-ECC9F3942E4B}">
-                <a14:imgProps xmlns:a14="http://schemas.microsoft.com/office/drawing/2010/main">
+                <a14:imgProps xmlns:a14="http://schemas.microsoft.com/office/drawing/2010/main" xmlns="">
                   <a14:imgLayer r:embed="rId8">
                     <a14:imgEffect>
                       <a14:brightnessContrast bright="25000"/>
@@ -6464,7 +6567,7 @@
                 </a14:imgProps>
               </a:ext>
               <a:ext uri="{28A0092B-C50C-407E-A947-70E740481C1C}">
-                <a14:useLocalDpi xmlns:a14="http://schemas.microsoft.com/office/drawing/2010/main" val="0"/>
+                <a14:useLocalDpi xmlns:a14="http://schemas.microsoft.com/office/drawing/2010/main" xmlns="" val="0"/>
               </a:ext>
             </a:extLst>
           </a:blip>
@@ -6494,7 +6597,7 @@
           <a:blip r:embed="rId9" cstate="print">
             <a:extLst>
               <a:ext uri="{BEBA8EAE-BF5A-486C-A8C5-ECC9F3942E4B}">
-                <a14:imgProps xmlns:a14="http://schemas.microsoft.com/office/drawing/2010/main">
+                <a14:imgProps xmlns:a14="http://schemas.microsoft.com/office/drawing/2010/main" xmlns="">
                   <a14:imgLayer r:embed="rId10">
                     <a14:imgEffect>
                       <a14:brightnessContrast bright="25000"/>
@@ -6503,7 +6606,7 @@
                 </a14:imgProps>
               </a:ext>
               <a:ext uri="{28A0092B-C50C-407E-A947-70E740481C1C}">
-                <a14:useLocalDpi xmlns:a14="http://schemas.microsoft.com/office/drawing/2010/main" val="0"/>
+                <a14:useLocalDpi xmlns:a14="http://schemas.microsoft.com/office/drawing/2010/main" xmlns="" val="0"/>
               </a:ext>
             </a:extLst>
           </a:blip>
@@ -6533,7 +6636,7 @@
           <a:blip r:embed="rId11" cstate="print">
             <a:extLst>
               <a:ext uri="{BEBA8EAE-BF5A-486C-A8C5-ECC9F3942E4B}">
-                <a14:imgProps xmlns:a14="http://schemas.microsoft.com/office/drawing/2010/main">
+                <a14:imgProps xmlns:a14="http://schemas.microsoft.com/office/drawing/2010/main" xmlns="">
                   <a14:imgLayer r:embed="rId12">
                     <a14:imgEffect>
                       <a14:brightnessContrast bright="25000"/>
@@ -6542,7 +6645,7 @@
                 </a14:imgProps>
               </a:ext>
               <a:ext uri="{28A0092B-C50C-407E-A947-70E740481C1C}">
-                <a14:useLocalDpi xmlns:a14="http://schemas.microsoft.com/office/drawing/2010/main" val="0"/>
+                <a14:useLocalDpi xmlns:a14="http://schemas.microsoft.com/office/drawing/2010/main" xmlns="" val="0"/>
               </a:ext>
             </a:extLst>
           </a:blip>
@@ -6572,7 +6675,7 @@
           <a:blip r:embed="rId13" cstate="print">
             <a:extLst>
               <a:ext uri="{BEBA8EAE-BF5A-486C-A8C5-ECC9F3942E4B}">
-                <a14:imgProps xmlns:a14="http://schemas.microsoft.com/office/drawing/2010/main">
+                <a14:imgProps xmlns:a14="http://schemas.microsoft.com/office/drawing/2010/main" xmlns="">
                   <a14:imgLayer r:embed="rId14">
                     <a14:imgEffect>
                       <a14:brightnessContrast bright="25000"/>
@@ -6581,7 +6684,7 @@
                 </a14:imgProps>
               </a:ext>
               <a:ext uri="{28A0092B-C50C-407E-A947-70E740481C1C}">
-                <a14:useLocalDpi xmlns:a14="http://schemas.microsoft.com/office/drawing/2010/main" val="0"/>
+                <a14:useLocalDpi xmlns:a14="http://schemas.microsoft.com/office/drawing/2010/main" xmlns="" val="0"/>
               </a:ext>
             </a:extLst>
           </a:blip>
@@ -6611,7 +6714,7 @@
           <a:blip r:embed="rId13" cstate="print">
             <a:extLst>
               <a:ext uri="{BEBA8EAE-BF5A-486C-A8C5-ECC9F3942E4B}">
-                <a14:imgProps xmlns:a14="http://schemas.microsoft.com/office/drawing/2010/main">
+                <a14:imgProps xmlns:a14="http://schemas.microsoft.com/office/drawing/2010/main" xmlns="">
                   <a14:imgLayer r:embed="rId14">
                     <a14:imgEffect>
                       <a14:brightnessContrast bright="25000"/>
@@ -6620,7 +6723,7 @@
                 </a14:imgProps>
               </a:ext>
               <a:ext uri="{28A0092B-C50C-407E-A947-70E740481C1C}">
-                <a14:useLocalDpi xmlns:a14="http://schemas.microsoft.com/office/drawing/2010/main" val="0"/>
+                <a14:useLocalDpi xmlns:a14="http://schemas.microsoft.com/office/drawing/2010/main" xmlns="" val="0"/>
               </a:ext>
             </a:extLst>
           </a:blip>
@@ -6650,7 +6753,7 @@
           <a:blip r:embed="rId13" cstate="print">
             <a:extLst>
               <a:ext uri="{BEBA8EAE-BF5A-486C-A8C5-ECC9F3942E4B}">
-                <a14:imgProps xmlns:a14="http://schemas.microsoft.com/office/drawing/2010/main">
+                <a14:imgProps xmlns:a14="http://schemas.microsoft.com/office/drawing/2010/main" xmlns="">
                   <a14:imgLayer r:embed="rId14">
                     <a14:imgEffect>
                       <a14:brightnessContrast bright="25000"/>
@@ -6659,7 +6762,7 @@
                 </a14:imgProps>
               </a:ext>
               <a:ext uri="{28A0092B-C50C-407E-A947-70E740481C1C}">
-                <a14:useLocalDpi xmlns:a14="http://schemas.microsoft.com/office/drawing/2010/main" val="0"/>
+                <a14:useLocalDpi xmlns:a14="http://schemas.microsoft.com/office/drawing/2010/main" xmlns="" val="0"/>
               </a:ext>
             </a:extLst>
           </a:blip>
@@ -6689,7 +6792,7 @@
           <a:blip r:embed="rId13" cstate="print">
             <a:extLst>
               <a:ext uri="{BEBA8EAE-BF5A-486C-A8C5-ECC9F3942E4B}">
-                <a14:imgProps xmlns:a14="http://schemas.microsoft.com/office/drawing/2010/main">
+                <a14:imgProps xmlns:a14="http://schemas.microsoft.com/office/drawing/2010/main" xmlns="">
                   <a14:imgLayer r:embed="rId14">
                     <a14:imgEffect>
                       <a14:brightnessContrast bright="25000"/>
@@ -6698,7 +6801,7 @@
                 </a14:imgProps>
               </a:ext>
               <a:ext uri="{28A0092B-C50C-407E-A947-70E740481C1C}">
-                <a14:useLocalDpi xmlns:a14="http://schemas.microsoft.com/office/drawing/2010/main" val="0"/>
+                <a14:useLocalDpi xmlns:a14="http://schemas.microsoft.com/office/drawing/2010/main" xmlns="" val="0"/>
               </a:ext>
             </a:extLst>
           </a:blip>
@@ -6728,7 +6831,7 @@
           <a:blip r:embed="rId13" cstate="print">
             <a:extLst>
               <a:ext uri="{BEBA8EAE-BF5A-486C-A8C5-ECC9F3942E4B}">
-                <a14:imgProps xmlns:a14="http://schemas.microsoft.com/office/drawing/2010/main">
+                <a14:imgProps xmlns:a14="http://schemas.microsoft.com/office/drawing/2010/main" xmlns="">
                   <a14:imgLayer r:embed="rId14">
                     <a14:imgEffect>
                       <a14:brightnessContrast bright="25000"/>
@@ -6737,7 +6840,7 @@
                 </a14:imgProps>
               </a:ext>
               <a:ext uri="{28A0092B-C50C-407E-A947-70E740481C1C}">
-                <a14:useLocalDpi xmlns:a14="http://schemas.microsoft.com/office/drawing/2010/main" val="0"/>
+                <a14:useLocalDpi xmlns:a14="http://schemas.microsoft.com/office/drawing/2010/main" xmlns="" val="0"/>
               </a:ext>
             </a:extLst>
           </a:blip>
@@ -6758,7 +6861,7 @@
     </p:spTree>
     <p:extLst>
       <p:ext uri="{BB962C8B-B14F-4D97-AF65-F5344CB8AC3E}">
-        <p14:creationId xmlns:p14="http://schemas.microsoft.com/office/powerpoint/2010/main" val="3948087111"/>
+        <p14:creationId xmlns:p14="http://schemas.microsoft.com/office/powerpoint/2010/main" xmlns="" val="3948087111"/>
       </p:ext>
     </p:extLst>
   </p:cSld>
@@ -6784,7 +6887,7 @@
           <a:blip r:embed="rId2">
             <a:extLst>
               <a:ext uri="{BEBA8EAE-BF5A-486C-A8C5-ECC9F3942E4B}">
-                <a14:imgProps xmlns:a14="http://schemas.microsoft.com/office/drawing/2010/main">
+                <a14:imgProps xmlns:a14="http://schemas.microsoft.com/office/drawing/2010/main" xmlns="">
                   <a14:imgLayer r:embed="rId3">
                     <a14:imgEffect>
                       <a14:brightnessContrast bright="15000"/>
@@ -6938,7 +7041,7 @@
           <a:blip r:embed="rId5">
             <a:extLst>
               <a:ext uri="{BEBA8EAE-BF5A-486C-A8C5-ECC9F3942E4B}">
-                <a14:imgProps xmlns:a14="http://schemas.microsoft.com/office/drawing/2010/main">
+                <a14:imgProps xmlns:a14="http://schemas.microsoft.com/office/drawing/2010/main" xmlns="">
                   <a14:imgLayer r:embed="rId6">
                     <a14:imgEffect>
                       <a14:brightnessContrast bright="25000"/>
@@ -6947,7 +7050,7 @@
                 </a14:imgProps>
               </a:ext>
               <a:ext uri="{28A0092B-C50C-407E-A947-70E740481C1C}">
-                <a14:useLocalDpi xmlns:a14="http://schemas.microsoft.com/office/drawing/2010/main" val="0"/>
+                <a14:useLocalDpi xmlns:a14="http://schemas.microsoft.com/office/drawing/2010/main" xmlns="" val="0"/>
               </a:ext>
             </a:extLst>
           </a:blip>
@@ -6968,7 +7071,7 @@
     </p:spTree>
     <p:extLst>
       <p:ext uri="{BB962C8B-B14F-4D97-AF65-F5344CB8AC3E}">
-        <p14:creationId xmlns:p14="http://schemas.microsoft.com/office/powerpoint/2010/main" val="3719468704"/>
+        <p14:creationId xmlns:p14="http://schemas.microsoft.com/office/powerpoint/2010/main" xmlns="" val="3719468704"/>
       </p:ext>
     </p:extLst>
   </p:cSld>
@@ -6994,7 +7097,7 @@
           <a:blip r:embed="rId2">
             <a:extLst>
               <a:ext uri="{BEBA8EAE-BF5A-486C-A8C5-ECC9F3942E4B}">
-                <a14:imgProps xmlns:a14="http://schemas.microsoft.com/office/drawing/2010/main">
+                <a14:imgProps xmlns:a14="http://schemas.microsoft.com/office/drawing/2010/main" xmlns="">
                   <a14:imgLayer r:embed="rId3">
                     <a14:imgEffect>
                       <a14:brightnessContrast bright="15000"/>
@@ -7036,7 +7139,7 @@
           <a:blip r:embed="rId4">
             <a:extLst>
               <a:ext uri="{BEBA8EAE-BF5A-486C-A8C5-ECC9F3942E4B}">
-                <a14:imgProps xmlns:a14="http://schemas.microsoft.com/office/drawing/2010/main">
+                <a14:imgProps xmlns:a14="http://schemas.microsoft.com/office/drawing/2010/main" xmlns="">
                   <a14:imgLayer r:embed="rId5">
                     <a14:imgEffect>
                       <a14:brightnessContrast bright="25000"/>
@@ -7045,7 +7148,7 @@
                 </a14:imgProps>
               </a:ext>
               <a:ext uri="{28A0092B-C50C-407E-A947-70E740481C1C}">
-                <a14:useLocalDpi xmlns:a14="http://schemas.microsoft.com/office/drawing/2010/main" val="0"/>
+                <a14:useLocalDpi xmlns:a14="http://schemas.microsoft.com/office/drawing/2010/main" xmlns="" val="0"/>
               </a:ext>
             </a:extLst>
           </a:blip>
@@ -7178,7 +7281,7 @@
     </p:spTree>
     <p:extLst>
       <p:ext uri="{BB962C8B-B14F-4D97-AF65-F5344CB8AC3E}">
-        <p14:creationId xmlns:p14="http://schemas.microsoft.com/office/powerpoint/2010/main" val="3973138725"/>
+        <p14:creationId xmlns:p14="http://schemas.microsoft.com/office/powerpoint/2010/main" xmlns="" val="3973138725"/>
       </p:ext>
     </p:extLst>
   </p:cSld>
@@ -7450,7 +7553,7 @@
   <a:extraClrSchemeLst/>
   <a:extLst>
     <a:ext uri="{05A4C25C-085E-4340-85A3-A5531E510DB2}">
-      <thm15:themeFamily xmlns:thm15="http://schemas.microsoft.com/office/thememl/2012/main" name="Office Theme" id="{62F939B6-93AF-4DB8-9C6B-D6C7DFDC589F}" vid="{4A3C46E8-61CC-4603-A589-7422A47A8E4A}"/>
+      <thm15:themeFamily xmlns:thm15="http://schemas.microsoft.com/office/thememl/2012/main" xmlns="" name="Office Theme" id="{62F939B6-93AF-4DB8-9C6B-D6C7DFDC589F}" vid="{4A3C46E8-61CC-4603-A589-7422A47A8E4A}"/>
     </a:ext>
   </a:extLst>
 </a:theme>

</xml_diff>